<commit_message>
Update gitignore and slides
</commit_message>
<xml_diff>
--- a/slides.pptx
+++ b/slides.pptx
@@ -6419,7 +6419,7 @@
           <a:p>
             <a:r>
               <a:rPr lang="en-ES" dirty="0"/>
-              <a:t>Esto no quiere decir que los elementos que te acabamos de enseñar ya no existan – simplemente son implícitos</a:t>
+              <a:t>Esto no quiere decir que los elementos que te acabamos de enseñar ya no existan – simplemente están implícitos</a:t>
             </a:r>
           </a:p>
           <a:p>
@@ -6896,6 +6896,13 @@
             <a:r>
               <a:rPr lang="en-ES" dirty="0"/>
               <a:t>¡…podréis modificar en vivo el contenido de dichas variables!</a:t>
+            </a:r>
+          </a:p>
+          <a:p>
+            <a:pPr lvl="1"/>
+            <a:r>
+              <a:rPr lang="en-ES" dirty="0"/>
+              <a:t>Y también podréis evaluar expresiones</a:t>
             </a:r>
           </a:p>
         </p:txBody>

</xml_diff>